<commit_message>
presentation stuff, more visualization sketches
Habe jetzt ein paar Skizzen, werde mich am WE noch in die Erweiterungen (Code einbinden) einlesen.
</commit_message>
<xml_diff>
--- a/presentation/Visualizing Objects in Java.pptx
+++ b/presentation/Visualizing Objects in Java.pptx
@@ -5,7 +5,7 @@
     <p:sldMasterId id="2147483648" r:id="rId1"/>
   </p:sldMasterIdLst>
   <p:notesMasterIdLst>
-    <p:notesMasterId r:id="rId14"/>
+    <p:notesMasterId r:id="rId18"/>
   </p:notesMasterIdLst>
   <p:sldIdLst>
     <p:sldId id="256" r:id="rId2"/>
@@ -19,7 +19,11 @@
     <p:sldId id="262" r:id="rId10"/>
     <p:sldId id="269" r:id="rId11"/>
     <p:sldId id="270" r:id="rId12"/>
-    <p:sldId id="266" r:id="rId13"/>
+    <p:sldId id="271" r:id="rId13"/>
+    <p:sldId id="272" r:id="rId14"/>
+    <p:sldId id="273" r:id="rId15"/>
+    <p:sldId id="274" r:id="rId16"/>
+    <p:sldId id="266" r:id="rId17"/>
   </p:sldIdLst>
   <p:sldSz cx="9144000" cy="6858000" type="screen4x3"/>
   <p:notesSz cx="6858000" cy="9144000"/>
@@ -204,7 +208,7 @@
             <a:fld id="{E931869C-E73F-44A3-8111-9724D18AD708}" type="datetimeFigureOut">
               <a:rPr lang="de-CH" smtClean="0"/>
               <a:pPr/>
-              <a:t>08.06.2011</a:t>
+              <a:t>09.06.2011</a:t>
             </a:fld>
             <a:endParaRPr lang="de-CH"/>
           </a:p>
@@ -375,7 +379,7 @@
     </p:spTree>
     <p:extLst>
       <p:ext uri="{BB962C8B-B14F-4D97-AF65-F5344CB8AC3E}">
-        <p14:creationId xmlns:p14="http://schemas.microsoft.com/office/powerpoint/2010/main" xmlns="" val="1372044409"/>
+        <p14:creationId xmlns="" xmlns:p14="http://schemas.microsoft.com/office/powerpoint/2010/main" val="1372044409"/>
       </p:ext>
     </p:extLst>
   </p:cSld>
@@ -657,7 +661,7 @@
             <a:fld id="{0B9876C0-AAE7-474F-8265-493986A54767}" type="datetimeFigureOut">
               <a:rPr lang="de-CH" smtClean="0"/>
               <a:pPr/>
-              <a:t>08.06.2011</a:t>
+              <a:t>09.06.2011</a:t>
             </a:fld>
             <a:endParaRPr lang="de-CH"/>
           </a:p>
@@ -824,7 +828,7 @@
             <a:fld id="{0B9876C0-AAE7-474F-8265-493986A54767}" type="datetimeFigureOut">
               <a:rPr lang="de-CH" smtClean="0"/>
               <a:pPr/>
-              <a:t>08.06.2011</a:t>
+              <a:t>09.06.2011</a:t>
             </a:fld>
             <a:endParaRPr lang="de-CH"/>
           </a:p>
@@ -1001,7 +1005,7 @@
             <a:fld id="{0B9876C0-AAE7-474F-8265-493986A54767}" type="datetimeFigureOut">
               <a:rPr lang="de-CH" smtClean="0"/>
               <a:pPr/>
-              <a:t>08.06.2011</a:t>
+              <a:t>09.06.2011</a:t>
             </a:fld>
             <a:endParaRPr lang="de-CH"/>
           </a:p>
@@ -1168,7 +1172,7 @@
             <a:fld id="{0B9876C0-AAE7-474F-8265-493986A54767}" type="datetimeFigureOut">
               <a:rPr lang="de-CH" smtClean="0"/>
               <a:pPr/>
-              <a:t>08.06.2011</a:t>
+              <a:t>09.06.2011</a:t>
             </a:fld>
             <a:endParaRPr lang="de-CH"/>
           </a:p>
@@ -1411,7 +1415,7 @@
             <a:fld id="{0B9876C0-AAE7-474F-8265-493986A54767}" type="datetimeFigureOut">
               <a:rPr lang="de-CH" smtClean="0"/>
               <a:pPr/>
-              <a:t>08.06.2011</a:t>
+              <a:t>09.06.2011</a:t>
             </a:fld>
             <a:endParaRPr lang="de-CH"/>
           </a:p>
@@ -1696,7 +1700,7 @@
             <a:fld id="{0B9876C0-AAE7-474F-8265-493986A54767}" type="datetimeFigureOut">
               <a:rPr lang="de-CH" smtClean="0"/>
               <a:pPr/>
-              <a:t>08.06.2011</a:t>
+              <a:t>09.06.2011</a:t>
             </a:fld>
             <a:endParaRPr lang="de-CH"/>
           </a:p>
@@ -2115,7 +2119,7 @@
             <a:fld id="{0B9876C0-AAE7-474F-8265-493986A54767}" type="datetimeFigureOut">
               <a:rPr lang="de-CH" smtClean="0"/>
               <a:pPr/>
-              <a:t>08.06.2011</a:t>
+              <a:t>09.06.2011</a:t>
             </a:fld>
             <a:endParaRPr lang="de-CH"/>
           </a:p>
@@ -2230,7 +2234,7 @@
             <a:fld id="{0B9876C0-AAE7-474F-8265-493986A54767}" type="datetimeFigureOut">
               <a:rPr lang="de-CH" smtClean="0"/>
               <a:pPr/>
-              <a:t>08.06.2011</a:t>
+              <a:t>09.06.2011</a:t>
             </a:fld>
             <a:endParaRPr lang="de-CH"/>
           </a:p>
@@ -2322,7 +2326,7 @@
             <a:fld id="{0B9876C0-AAE7-474F-8265-493986A54767}" type="datetimeFigureOut">
               <a:rPr lang="de-CH" smtClean="0"/>
               <a:pPr/>
-              <a:t>08.06.2011</a:t>
+              <a:t>09.06.2011</a:t>
             </a:fld>
             <a:endParaRPr lang="de-CH"/>
           </a:p>
@@ -2596,7 +2600,7 @@
             <a:fld id="{0B9876C0-AAE7-474F-8265-493986A54767}" type="datetimeFigureOut">
               <a:rPr lang="de-CH" smtClean="0"/>
               <a:pPr/>
-              <a:t>08.06.2011</a:t>
+              <a:t>09.06.2011</a:t>
             </a:fld>
             <a:endParaRPr lang="de-CH"/>
           </a:p>
@@ -2846,7 +2850,7 @@
             <a:fld id="{0B9876C0-AAE7-474F-8265-493986A54767}" type="datetimeFigureOut">
               <a:rPr lang="de-CH" smtClean="0"/>
               <a:pPr/>
-              <a:t>08.06.2011</a:t>
+              <a:t>09.06.2011</a:t>
             </a:fld>
             <a:endParaRPr lang="de-CH"/>
           </a:p>
@@ -3056,7 +3060,7 @@
             <a:fld id="{0B9876C0-AAE7-474F-8265-493986A54767}" type="datetimeFigureOut">
               <a:rPr lang="de-CH" smtClean="0"/>
               <a:pPr/>
-              <a:t>08.06.2011</a:t>
+              <a:t>09.06.2011</a:t>
             </a:fld>
             <a:endParaRPr lang="de-CH"/>
           </a:p>
@@ -3608,7 +3612,7 @@
         </p:blipFill>
         <p:spPr bwMode="auto">
           <a:xfrm>
-            <a:off x="-468560" y="476672"/>
+            <a:off x="-468560" y="-27384"/>
             <a:ext cx="9794302" cy="6120680"/>
           </a:xfrm>
           <a:prstGeom prst="rect">
@@ -3704,7 +3708,7 @@
         </p:blipFill>
         <p:spPr bwMode="auto">
           <a:xfrm>
-            <a:off x="-108520" y="0"/>
+            <a:off x="-108520" y="-288032"/>
             <a:ext cx="10326618" cy="6453336"/>
           </a:xfrm>
           <a:prstGeom prst="rect">
@@ -3729,6 +3733,390 @@
 </file>
 
 <file path=ppt/slides/slide12.xml><?xml version="1.0" encoding="utf-8"?>
+<p:sld xmlns:a="http://schemas.openxmlformats.org/drawingml/2006/main" xmlns:r="http://schemas.openxmlformats.org/officeDocument/2006/relationships" xmlns:p="http://schemas.openxmlformats.org/presentationml/2006/main">
+  <p:cSld>
+    <p:spTree>
+      <p:nvGrpSpPr>
+        <p:cNvPr id="1" name=""/>
+        <p:cNvGrpSpPr/>
+        <p:nvPr/>
+      </p:nvGrpSpPr>
+      <p:grpSpPr>
+        <a:xfrm>
+          <a:off x="0" y="0"/>
+          <a:ext cx="0" cy="0"/>
+          <a:chOff x="0" y="0"/>
+          <a:chExt cx="0" cy="0"/>
+        </a:xfrm>
+      </p:grpSpPr>
+      <p:sp>
+        <p:nvSpPr>
+          <p:cNvPr id="2" name="Titel 1"/>
+          <p:cNvSpPr>
+            <a:spLocks noGrp="1"/>
+          </p:cNvSpPr>
+          <p:nvPr>
+            <p:ph type="title"/>
+          </p:nvPr>
+        </p:nvSpPr>
+        <p:spPr/>
+        <p:txBody>
+          <a:bodyPr/>
+          <a:lstStyle/>
+          <a:p>
+            <a:endParaRPr lang="de-CH"/>
+          </a:p>
+        </p:txBody>
+      </p:sp>
+      <p:sp>
+        <p:nvSpPr>
+          <p:cNvPr id="3" name="Inhaltsplatzhalter 2"/>
+          <p:cNvSpPr>
+            <a:spLocks noGrp="1"/>
+          </p:cNvSpPr>
+          <p:nvPr>
+            <p:ph idx="1"/>
+          </p:nvPr>
+        </p:nvSpPr>
+        <p:spPr/>
+        <p:txBody>
+          <a:bodyPr/>
+          <a:lstStyle/>
+          <a:p>
+            <a:endParaRPr lang="de-CH"/>
+          </a:p>
+        </p:txBody>
+      </p:sp>
+      <p:pic>
+        <p:nvPicPr>
+          <p:cNvPr id="1026" name="Picture 2" descr="C:\Users\Reichenbach Cedric\Dropbox\studium\ba\pics presentation\skizze visualization 2 Kopie.jpg"/>
+          <p:cNvPicPr>
+            <a:picLocks noChangeAspect="1" noChangeArrowheads="1"/>
+          </p:cNvPicPr>
+          <p:nvPr/>
+        </p:nvPicPr>
+        <p:blipFill>
+          <a:blip r:embed="rId2" cstate="print"/>
+          <a:srcRect/>
+          <a:stretch>
+            <a:fillRect/>
+          </a:stretch>
+        </p:blipFill>
+        <p:spPr bwMode="auto">
+          <a:xfrm>
+            <a:off x="-396552" y="-243408"/>
+            <a:ext cx="10326618" cy="6453336"/>
+          </a:xfrm>
+          <a:prstGeom prst="rect">
+            <a:avLst/>
+          </a:prstGeom>
+          <a:noFill/>
+        </p:spPr>
+      </p:pic>
+    </p:spTree>
+  </p:cSld>
+  <p:clrMapOvr>
+    <a:masterClrMapping/>
+  </p:clrMapOvr>
+  <p:timing>
+    <p:tnLst>
+      <p:par>
+        <p:cTn id="1" dur="indefinite" restart="never" nodeType="tmRoot"/>
+      </p:par>
+    </p:tnLst>
+  </p:timing>
+</p:sld>
+</file>
+
+<file path=ppt/slides/slide13.xml><?xml version="1.0" encoding="utf-8"?>
+<p:sld xmlns:a="http://schemas.openxmlformats.org/drawingml/2006/main" xmlns:r="http://schemas.openxmlformats.org/officeDocument/2006/relationships" xmlns:p="http://schemas.openxmlformats.org/presentationml/2006/main">
+  <p:cSld>
+    <p:spTree>
+      <p:nvGrpSpPr>
+        <p:cNvPr id="1" name=""/>
+        <p:cNvGrpSpPr/>
+        <p:nvPr/>
+      </p:nvGrpSpPr>
+      <p:grpSpPr>
+        <a:xfrm>
+          <a:off x="0" y="0"/>
+          <a:ext cx="0" cy="0"/>
+          <a:chOff x="0" y="0"/>
+          <a:chExt cx="0" cy="0"/>
+        </a:xfrm>
+      </p:grpSpPr>
+      <p:sp>
+        <p:nvSpPr>
+          <p:cNvPr id="2" name="Titel 1"/>
+          <p:cNvSpPr>
+            <a:spLocks noGrp="1"/>
+          </p:cNvSpPr>
+          <p:nvPr>
+            <p:ph type="title"/>
+          </p:nvPr>
+        </p:nvSpPr>
+        <p:spPr/>
+        <p:txBody>
+          <a:bodyPr/>
+          <a:lstStyle/>
+          <a:p>
+            <a:endParaRPr lang="de-CH"/>
+          </a:p>
+        </p:txBody>
+      </p:sp>
+      <p:sp>
+        <p:nvSpPr>
+          <p:cNvPr id="3" name="Inhaltsplatzhalter 2"/>
+          <p:cNvSpPr>
+            <a:spLocks noGrp="1"/>
+          </p:cNvSpPr>
+          <p:nvPr>
+            <p:ph idx="1"/>
+          </p:nvPr>
+        </p:nvSpPr>
+        <p:spPr/>
+        <p:txBody>
+          <a:bodyPr/>
+          <a:lstStyle/>
+          <a:p>
+            <a:endParaRPr lang="de-CH"/>
+          </a:p>
+        </p:txBody>
+      </p:sp>
+      <p:pic>
+        <p:nvPicPr>
+          <p:cNvPr id="2050" name="Picture 2" descr="C:\Users\Reichenbach Cedric\Dropbox\studium\ba\pics presentation\skizze visualization player zoomed 2 Kopie.jpg"/>
+          <p:cNvPicPr>
+            <a:picLocks noChangeAspect="1" noChangeArrowheads="1"/>
+          </p:cNvPicPr>
+          <p:nvPr/>
+        </p:nvPicPr>
+        <p:blipFill>
+          <a:blip r:embed="rId2" cstate="print"/>
+          <a:srcRect r="16458" b="5263"/>
+          <a:stretch>
+            <a:fillRect/>
+          </a:stretch>
+        </p:blipFill>
+        <p:spPr bwMode="auto">
+          <a:xfrm>
+            <a:off x="-324544" y="-603448"/>
+            <a:ext cx="9721080" cy="6888954"/>
+          </a:xfrm>
+          <a:prstGeom prst="rect">
+            <a:avLst/>
+          </a:prstGeom>
+          <a:noFill/>
+        </p:spPr>
+      </p:pic>
+    </p:spTree>
+  </p:cSld>
+  <p:clrMapOvr>
+    <a:masterClrMapping/>
+  </p:clrMapOvr>
+  <p:timing>
+    <p:tnLst>
+      <p:par>
+        <p:cTn id="1" dur="indefinite" restart="never" nodeType="tmRoot"/>
+      </p:par>
+    </p:tnLst>
+  </p:timing>
+</p:sld>
+</file>
+
+<file path=ppt/slides/slide14.xml><?xml version="1.0" encoding="utf-8"?>
+<p:sld xmlns:a="http://schemas.openxmlformats.org/drawingml/2006/main" xmlns:r="http://schemas.openxmlformats.org/officeDocument/2006/relationships" xmlns:p="http://schemas.openxmlformats.org/presentationml/2006/main">
+  <p:cSld>
+    <p:spTree>
+      <p:nvGrpSpPr>
+        <p:cNvPr id="1" name=""/>
+        <p:cNvGrpSpPr/>
+        <p:nvPr/>
+      </p:nvGrpSpPr>
+      <p:grpSpPr>
+        <a:xfrm>
+          <a:off x="0" y="0"/>
+          <a:ext cx="0" cy="0"/>
+          <a:chOff x="0" y="0"/>
+          <a:chExt cx="0" cy="0"/>
+        </a:xfrm>
+      </p:grpSpPr>
+      <p:sp>
+        <p:nvSpPr>
+          <p:cNvPr id="2" name="Titel 1"/>
+          <p:cNvSpPr>
+            <a:spLocks noGrp="1"/>
+          </p:cNvSpPr>
+          <p:nvPr>
+            <p:ph type="title"/>
+          </p:nvPr>
+        </p:nvSpPr>
+        <p:spPr/>
+        <p:txBody>
+          <a:bodyPr/>
+          <a:lstStyle/>
+          <a:p>
+            <a:endParaRPr lang="de-CH"/>
+          </a:p>
+        </p:txBody>
+      </p:sp>
+      <p:sp>
+        <p:nvSpPr>
+          <p:cNvPr id="3" name="Inhaltsplatzhalter 2"/>
+          <p:cNvSpPr>
+            <a:spLocks noGrp="1"/>
+          </p:cNvSpPr>
+          <p:nvPr>
+            <p:ph idx="1"/>
+          </p:nvPr>
+        </p:nvSpPr>
+        <p:spPr/>
+        <p:txBody>
+          <a:bodyPr/>
+          <a:lstStyle/>
+          <a:p>
+            <a:endParaRPr lang="de-CH"/>
+          </a:p>
+        </p:txBody>
+      </p:sp>
+      <p:pic>
+        <p:nvPicPr>
+          <p:cNvPr id="3074" name="Picture 2" descr="C:\Users\Reichenbach Cedric\Dropbox\studium\ba\pics presentation\skizze visualization 3 Kopie.jpg"/>
+          <p:cNvPicPr>
+            <a:picLocks noChangeAspect="1" noChangeArrowheads="1"/>
+          </p:cNvPicPr>
+          <p:nvPr/>
+        </p:nvPicPr>
+        <p:blipFill>
+          <a:blip r:embed="rId2" cstate="print"/>
+          <a:srcRect/>
+          <a:stretch>
+            <a:fillRect/>
+          </a:stretch>
+        </p:blipFill>
+        <p:spPr bwMode="auto">
+          <a:xfrm>
+            <a:off x="-252536" y="-171400"/>
+            <a:ext cx="10729192" cy="6704914"/>
+          </a:xfrm>
+          <a:prstGeom prst="rect">
+            <a:avLst/>
+          </a:prstGeom>
+          <a:noFill/>
+        </p:spPr>
+      </p:pic>
+    </p:spTree>
+  </p:cSld>
+  <p:clrMapOvr>
+    <a:masterClrMapping/>
+  </p:clrMapOvr>
+  <p:timing>
+    <p:tnLst>
+      <p:par>
+        <p:cTn id="1" dur="indefinite" restart="never" nodeType="tmRoot"/>
+      </p:par>
+    </p:tnLst>
+  </p:timing>
+</p:sld>
+</file>
+
+<file path=ppt/slides/slide15.xml><?xml version="1.0" encoding="utf-8"?>
+<p:sld xmlns:a="http://schemas.openxmlformats.org/drawingml/2006/main" xmlns:r="http://schemas.openxmlformats.org/officeDocument/2006/relationships" xmlns:p="http://schemas.openxmlformats.org/presentationml/2006/main">
+  <p:cSld>
+    <p:spTree>
+      <p:nvGrpSpPr>
+        <p:cNvPr id="1" name=""/>
+        <p:cNvGrpSpPr/>
+        <p:nvPr/>
+      </p:nvGrpSpPr>
+      <p:grpSpPr>
+        <a:xfrm>
+          <a:off x="0" y="0"/>
+          <a:ext cx="0" cy="0"/>
+          <a:chOff x="0" y="0"/>
+          <a:chExt cx="0" cy="0"/>
+        </a:xfrm>
+      </p:grpSpPr>
+      <p:sp>
+        <p:nvSpPr>
+          <p:cNvPr id="2" name="Titel 1"/>
+          <p:cNvSpPr>
+            <a:spLocks noGrp="1"/>
+          </p:cNvSpPr>
+          <p:nvPr>
+            <p:ph type="title"/>
+          </p:nvPr>
+        </p:nvSpPr>
+        <p:spPr/>
+        <p:txBody>
+          <a:bodyPr/>
+          <a:lstStyle/>
+          <a:p>
+            <a:endParaRPr lang="de-CH"/>
+          </a:p>
+        </p:txBody>
+      </p:sp>
+      <p:sp>
+        <p:nvSpPr>
+          <p:cNvPr id="3" name="Inhaltsplatzhalter 2"/>
+          <p:cNvSpPr>
+            <a:spLocks noGrp="1"/>
+          </p:cNvSpPr>
+          <p:nvPr>
+            <p:ph idx="1"/>
+          </p:nvPr>
+        </p:nvSpPr>
+        <p:spPr/>
+        <p:txBody>
+          <a:bodyPr/>
+          <a:lstStyle/>
+          <a:p>
+            <a:endParaRPr lang="de-CH"/>
+          </a:p>
+        </p:txBody>
+      </p:sp>
+      <p:pic>
+        <p:nvPicPr>
+          <p:cNvPr id="4099" name="Picture 3" descr="C:\Users\Reichenbach Cedric\Dropbox\studium\ba\pics presentation\skizze visualization player zoomed 3 Kopie.jpg"/>
+          <p:cNvPicPr>
+            <a:picLocks noChangeAspect="1" noChangeArrowheads="1"/>
+          </p:cNvPicPr>
+          <p:nvPr/>
+        </p:nvPicPr>
+        <p:blipFill>
+          <a:blip r:embed="rId2" cstate="print"/>
+          <a:srcRect/>
+          <a:stretch>
+            <a:fillRect/>
+          </a:stretch>
+        </p:blipFill>
+        <p:spPr bwMode="auto">
+          <a:xfrm>
+            <a:off x="-36513" y="-315416"/>
+            <a:ext cx="10600893" cy="6624736"/>
+          </a:xfrm>
+          <a:prstGeom prst="rect">
+            <a:avLst/>
+          </a:prstGeom>
+          <a:noFill/>
+        </p:spPr>
+      </p:pic>
+    </p:spTree>
+  </p:cSld>
+  <p:clrMapOvr>
+    <a:masterClrMapping/>
+  </p:clrMapOvr>
+  <p:timing>
+    <p:tnLst>
+      <p:par>
+        <p:cTn id="1" dur="indefinite" restart="never" nodeType="tmRoot"/>
+      </p:par>
+    </p:tnLst>
+  </p:timing>
+</p:sld>
+</file>
+
+<file path=ppt/slides/slide16.xml><?xml version="1.0" encoding="utf-8"?>
 <p:sld xmlns:a="http://schemas.openxmlformats.org/drawingml/2006/main" xmlns:r="http://schemas.openxmlformats.org/officeDocument/2006/relationships" xmlns:p="http://schemas.openxmlformats.org/presentationml/2006/main">
   <p:cSld>
     <p:spTree>
@@ -5321,7 +5709,7 @@
     </p:spTree>
     <p:extLst>
       <p:ext uri="{BB962C8B-B14F-4D97-AF65-F5344CB8AC3E}">
-        <p14:creationId xmlns:p14="http://schemas.microsoft.com/office/powerpoint/2010/main" xmlns="" val="668186958"/>
+        <p14:creationId xmlns="" xmlns:p14="http://schemas.microsoft.com/office/powerpoint/2010/main" val="668186958"/>
       </p:ext>
     </p:extLst>
   </p:cSld>
@@ -6594,7 +6982,7 @@
     </p:spTree>
     <p:extLst>
       <p:ext uri="{BB962C8B-B14F-4D97-AF65-F5344CB8AC3E}">
-        <p14:creationId xmlns:p14="http://schemas.microsoft.com/office/powerpoint/2010/main" xmlns="" val="323489840"/>
+        <p14:creationId xmlns="" xmlns:p14="http://schemas.microsoft.com/office/powerpoint/2010/main" val="323489840"/>
       </p:ext>
     </p:extLst>
   </p:cSld>

</xml_diff>